<commit_message>
added collar plots to ppt
</commit_message>
<xml_diff>
--- a/Chamber_Temp_Plots.pptx
+++ b/Chamber_Temp_Plots.pptx
@@ -5,7 +5,7 @@
     <p:sldMasterId id="2147483648" r:id="rId1"/>
   </p:sldMasterIdLst>
   <p:notesMasterIdLst>
-    <p:notesMasterId r:id="rId8"/>
+    <p:notesMasterId r:id="rId19"/>
   </p:notesMasterIdLst>
   <p:sldIdLst>
     <p:sldId id="256" r:id="rId2"/>
@@ -14,6 +14,17 @@
     <p:sldId id="259" r:id="rId5"/>
     <p:sldId id="260" r:id="rId6"/>
     <p:sldId id="261" r:id="rId7"/>
+    <p:sldId id="262" r:id="rId8"/>
+    <p:sldId id="263" r:id="rId9"/>
+    <p:sldId id="264" r:id="rId10"/>
+    <p:sldId id="265" r:id="rId11"/>
+    <p:sldId id="266" r:id="rId12"/>
+    <p:sldId id="267" r:id="rId13"/>
+    <p:sldId id="268" r:id="rId14"/>
+    <p:sldId id="269" r:id="rId15"/>
+    <p:sldId id="270" r:id="rId16"/>
+    <p:sldId id="271" r:id="rId17"/>
+    <p:sldId id="272" r:id="rId18"/>
   </p:sldIdLst>
   <p:sldSz cx="12192000" cy="6858000"/>
   <p:notesSz cx="6858000" cy="9144000"/>
@@ -112,6 +123,11 @@
       </a:defRPr>
     </a:lvl9pPr>
   </p:defaultTextStyle>
+  <p:extLst>
+    <p:ext uri="{EFAFB233-063F-42B5-8137-9DF3F51BA10A}">
+      <p15:sldGuideLst xmlns:p15="http://schemas.microsoft.com/office/powerpoint/2012/main"/>
+    </p:ext>
+  </p:extLst>
 </p:presentation>
 </file>
 
@@ -197,7 +213,7 @@
           <a:p>
             <a:fld id="{A434839A-2C3C-4D34-B207-C0E9B9A1E93C}" type="datetimeFigureOut">
               <a:rPr lang="en-US" smtClean="0"/>
-              <a:t>11/15/2022</a:t>
+              <a:t>11/17/2022</a:t>
             </a:fld>
             <a:endParaRPr lang="en-US"/>
           </a:p>
@@ -611,7 +627,7 @@
           <a:p>
             <a:fld id="{06855847-28EF-4344-B227-22634D61D7BE}" type="datetimeFigureOut">
               <a:rPr lang="en-US" smtClean="0"/>
-              <a:t>11/15/2022</a:t>
+              <a:t>11/17/2022</a:t>
             </a:fld>
             <a:endParaRPr lang="en-US"/>
           </a:p>
@@ -809,7 +825,7 @@
           <a:p>
             <a:fld id="{06855847-28EF-4344-B227-22634D61D7BE}" type="datetimeFigureOut">
               <a:rPr lang="en-US" smtClean="0"/>
-              <a:t>11/15/2022</a:t>
+              <a:t>11/17/2022</a:t>
             </a:fld>
             <a:endParaRPr lang="en-US"/>
           </a:p>
@@ -1017,7 +1033,7 @@
           <a:p>
             <a:fld id="{06855847-28EF-4344-B227-22634D61D7BE}" type="datetimeFigureOut">
               <a:rPr lang="en-US" smtClean="0"/>
-              <a:t>11/15/2022</a:t>
+              <a:t>11/17/2022</a:t>
             </a:fld>
             <a:endParaRPr lang="en-US"/>
           </a:p>
@@ -1215,7 +1231,7 @@
           <a:p>
             <a:fld id="{06855847-28EF-4344-B227-22634D61D7BE}" type="datetimeFigureOut">
               <a:rPr lang="en-US" smtClean="0"/>
-              <a:t>11/15/2022</a:t>
+              <a:t>11/17/2022</a:t>
             </a:fld>
             <a:endParaRPr lang="en-US"/>
           </a:p>
@@ -1490,7 +1506,7 @@
           <a:p>
             <a:fld id="{06855847-28EF-4344-B227-22634D61D7BE}" type="datetimeFigureOut">
               <a:rPr lang="en-US" smtClean="0"/>
-              <a:t>11/15/2022</a:t>
+              <a:t>11/17/2022</a:t>
             </a:fld>
             <a:endParaRPr lang="en-US"/>
           </a:p>
@@ -1755,7 +1771,7 @@
           <a:p>
             <a:fld id="{06855847-28EF-4344-B227-22634D61D7BE}" type="datetimeFigureOut">
               <a:rPr lang="en-US" smtClean="0"/>
-              <a:t>11/15/2022</a:t>
+              <a:t>11/17/2022</a:t>
             </a:fld>
             <a:endParaRPr lang="en-US"/>
           </a:p>
@@ -2167,7 +2183,7 @@
           <a:p>
             <a:fld id="{06855847-28EF-4344-B227-22634D61D7BE}" type="datetimeFigureOut">
               <a:rPr lang="en-US" smtClean="0"/>
-              <a:t>11/15/2022</a:t>
+              <a:t>11/17/2022</a:t>
             </a:fld>
             <a:endParaRPr lang="en-US"/>
           </a:p>
@@ -2308,7 +2324,7 @@
           <a:p>
             <a:fld id="{06855847-28EF-4344-B227-22634D61D7BE}" type="datetimeFigureOut">
               <a:rPr lang="en-US" smtClean="0"/>
-              <a:t>11/15/2022</a:t>
+              <a:t>11/17/2022</a:t>
             </a:fld>
             <a:endParaRPr lang="en-US"/>
           </a:p>
@@ -2421,7 +2437,7 @@
           <a:p>
             <a:fld id="{06855847-28EF-4344-B227-22634D61D7BE}" type="datetimeFigureOut">
               <a:rPr lang="en-US" smtClean="0"/>
-              <a:t>11/15/2022</a:t>
+              <a:t>11/17/2022</a:t>
             </a:fld>
             <a:endParaRPr lang="en-US"/>
           </a:p>
@@ -2732,7 +2748,7 @@
           <a:p>
             <a:fld id="{06855847-28EF-4344-B227-22634D61D7BE}" type="datetimeFigureOut">
               <a:rPr lang="en-US" smtClean="0"/>
-              <a:t>11/15/2022</a:t>
+              <a:t>11/17/2022</a:t>
             </a:fld>
             <a:endParaRPr lang="en-US"/>
           </a:p>
@@ -3020,7 +3036,7 @@
           <a:p>
             <a:fld id="{06855847-28EF-4344-B227-22634D61D7BE}" type="datetimeFigureOut">
               <a:rPr lang="en-US" smtClean="0"/>
-              <a:t>11/15/2022</a:t>
+              <a:t>11/17/2022</a:t>
             </a:fld>
             <a:endParaRPr lang="en-US"/>
           </a:p>
@@ -3261,7 +3277,7 @@
           <a:p>
             <a:fld id="{06855847-28EF-4344-B227-22634D61D7BE}" type="datetimeFigureOut">
               <a:rPr lang="en-US" smtClean="0"/>
-              <a:t>11/15/2022</a:t>
+              <a:t>11/17/2022</a:t>
             </a:fld>
             <a:endParaRPr lang="en-US"/>
           </a:p>
@@ -3762,6 +3778,1394 @@
 </p:sld>
 </file>
 
+<file path=ppt/slides/slide10.xml><?xml version="1.0" encoding="utf-8"?>
+<p:sld xmlns:a="http://schemas.openxmlformats.org/drawingml/2006/main" xmlns:r="http://schemas.openxmlformats.org/officeDocument/2006/relationships" xmlns:p="http://schemas.openxmlformats.org/presentationml/2006/main">
+  <p:cSld>
+    <p:spTree>
+      <p:nvGrpSpPr>
+        <p:cNvPr id="1" name=""/>
+        <p:cNvGrpSpPr/>
+        <p:nvPr/>
+      </p:nvGrpSpPr>
+      <p:grpSpPr>
+        <a:xfrm>
+          <a:off x="0" y="0"/>
+          <a:ext cx="0" cy="0"/>
+          <a:chOff x="0" y="0"/>
+          <a:chExt cx="0" cy="0"/>
+        </a:xfrm>
+      </p:grpSpPr>
+      <p:pic>
+        <p:nvPicPr>
+          <p:cNvPr id="2" name="Picture 1">
+            <a:extLst>
+              <a:ext uri="{FF2B5EF4-FFF2-40B4-BE49-F238E27FC236}">
+                <a16:creationId xmlns:a16="http://schemas.microsoft.com/office/drawing/2014/main" id="{1AED94A4-2EBF-12EA-0746-F4A989163FDD}"/>
+              </a:ext>
+            </a:extLst>
+          </p:cNvPr>
+          <p:cNvPicPr>
+            <a:picLocks noChangeAspect="1"/>
+          </p:cNvPicPr>
+          <p:nvPr/>
+        </p:nvPicPr>
+        <p:blipFill>
+          <a:blip r:embed="rId2">
+            <a:extLst>
+              <a:ext uri="{28A0092B-C50C-407E-A947-70E740481C1C}">
+                <a14:useLocalDpi xmlns:a14="http://schemas.microsoft.com/office/drawing/2010/main" val="0"/>
+              </a:ext>
+            </a:extLst>
+          </a:blip>
+          <a:stretch>
+            <a:fillRect/>
+          </a:stretch>
+        </p:blipFill>
+        <p:spPr>
+          <a:xfrm>
+            <a:off x="199045" y="445332"/>
+            <a:ext cx="9144018" cy="2743205"/>
+          </a:xfrm>
+          <a:prstGeom prst="rect">
+            <a:avLst/>
+          </a:prstGeom>
+        </p:spPr>
+      </p:pic>
+      <p:sp>
+        <p:nvSpPr>
+          <p:cNvPr id="3" name="TextBox 2">
+            <a:extLst>
+              <a:ext uri="{FF2B5EF4-FFF2-40B4-BE49-F238E27FC236}">
+                <a16:creationId xmlns:a16="http://schemas.microsoft.com/office/drawing/2014/main" id="{02F76980-6B0E-4F75-C76A-74556BD100B8}"/>
+              </a:ext>
+            </a:extLst>
+          </p:cNvPr>
+          <p:cNvSpPr txBox="1"/>
+          <p:nvPr/>
+        </p:nvSpPr>
+        <p:spPr>
+          <a:xfrm>
+            <a:off x="9205563" y="1436914"/>
+            <a:ext cx="2084478" cy="369332"/>
+          </a:xfrm>
+          <a:prstGeom prst="rect">
+            <a:avLst/>
+          </a:prstGeom>
+          <a:noFill/>
+        </p:spPr>
+        <p:txBody>
+          <a:bodyPr wrap="square" rtlCol="0">
+            <a:spAutoFit/>
+          </a:bodyPr>
+          <a:lstStyle/>
+          <a:p>
+            <a:r>
+              <a:rPr lang="en-US" dirty="0"/>
+              <a:t>Forest Interior 3</a:t>
+            </a:r>
+          </a:p>
+        </p:txBody>
+      </p:sp>
+      <p:pic>
+        <p:nvPicPr>
+          <p:cNvPr id="5" name="Picture 4">
+            <a:extLst>
+              <a:ext uri="{FF2B5EF4-FFF2-40B4-BE49-F238E27FC236}">
+                <a16:creationId xmlns:a16="http://schemas.microsoft.com/office/drawing/2014/main" id="{855CFEE8-705E-77FA-A1EE-34684167A138}"/>
+              </a:ext>
+            </a:extLst>
+          </p:cNvPr>
+          <p:cNvPicPr>
+            <a:picLocks noChangeAspect="1"/>
+          </p:cNvPicPr>
+          <p:nvPr/>
+        </p:nvPicPr>
+        <p:blipFill>
+          <a:blip r:embed="rId3">
+            <a:extLst>
+              <a:ext uri="{28A0092B-C50C-407E-A947-70E740481C1C}">
+                <a14:useLocalDpi xmlns:a14="http://schemas.microsoft.com/office/drawing/2010/main" val="0"/>
+              </a:ext>
+            </a:extLst>
+          </a:blip>
+          <a:stretch>
+            <a:fillRect/>
+          </a:stretch>
+        </p:blipFill>
+        <p:spPr>
+          <a:xfrm>
+            <a:off x="292350" y="3483628"/>
+            <a:ext cx="9144018" cy="2743205"/>
+          </a:xfrm>
+          <a:prstGeom prst="rect">
+            <a:avLst/>
+          </a:prstGeom>
+        </p:spPr>
+      </p:pic>
+      <p:sp>
+        <p:nvSpPr>
+          <p:cNvPr id="6" name="TextBox 5">
+            <a:extLst>
+              <a:ext uri="{FF2B5EF4-FFF2-40B4-BE49-F238E27FC236}">
+                <a16:creationId xmlns:a16="http://schemas.microsoft.com/office/drawing/2014/main" id="{A8656F2E-41B5-A3C0-3E09-D06A7E21831F}"/>
+              </a:ext>
+            </a:extLst>
+          </p:cNvPr>
+          <p:cNvSpPr txBox="1"/>
+          <p:nvPr/>
+        </p:nvSpPr>
+        <p:spPr>
+          <a:xfrm>
+            <a:off x="9436368" y="4301412"/>
+            <a:ext cx="2084478" cy="369332"/>
+          </a:xfrm>
+          <a:prstGeom prst="rect">
+            <a:avLst/>
+          </a:prstGeom>
+          <a:noFill/>
+        </p:spPr>
+        <p:txBody>
+          <a:bodyPr wrap="square" rtlCol="0">
+            <a:spAutoFit/>
+          </a:bodyPr>
+          <a:lstStyle/>
+          <a:p>
+            <a:r>
+              <a:rPr lang="en-US" dirty="0"/>
+              <a:t>Forest Interior 4</a:t>
+            </a:r>
+          </a:p>
+        </p:txBody>
+      </p:sp>
+    </p:spTree>
+    <p:extLst>
+      <p:ext uri="{BB962C8B-B14F-4D97-AF65-F5344CB8AC3E}">
+        <p14:creationId xmlns:p14="http://schemas.microsoft.com/office/powerpoint/2010/main" val="2134322974"/>
+      </p:ext>
+    </p:extLst>
+  </p:cSld>
+  <p:clrMapOvr>
+    <a:masterClrMapping/>
+  </p:clrMapOvr>
+</p:sld>
+</file>
+
+<file path=ppt/slides/slide11.xml><?xml version="1.0" encoding="utf-8"?>
+<p:sld xmlns:a="http://schemas.openxmlformats.org/drawingml/2006/main" xmlns:r="http://schemas.openxmlformats.org/officeDocument/2006/relationships" xmlns:p="http://schemas.openxmlformats.org/presentationml/2006/main">
+  <p:cSld>
+    <p:spTree>
+      <p:nvGrpSpPr>
+        <p:cNvPr id="1" name=""/>
+        <p:cNvGrpSpPr/>
+        <p:nvPr/>
+      </p:nvGrpSpPr>
+      <p:grpSpPr>
+        <a:xfrm>
+          <a:off x="0" y="0"/>
+          <a:ext cx="0" cy="0"/>
+          <a:chOff x="0" y="0"/>
+          <a:chExt cx="0" cy="0"/>
+        </a:xfrm>
+      </p:grpSpPr>
+      <p:pic>
+        <p:nvPicPr>
+          <p:cNvPr id="3" name="Picture 2">
+            <a:extLst>
+              <a:ext uri="{FF2B5EF4-FFF2-40B4-BE49-F238E27FC236}">
+                <a16:creationId xmlns:a16="http://schemas.microsoft.com/office/drawing/2014/main" id="{FAA7CEBE-7C10-EEBD-3589-CCC628493D9D}"/>
+              </a:ext>
+            </a:extLst>
+          </p:cNvPr>
+          <p:cNvPicPr>
+            <a:picLocks noChangeAspect="1"/>
+          </p:cNvPicPr>
+          <p:nvPr/>
+        </p:nvPicPr>
+        <p:blipFill>
+          <a:blip r:embed="rId2">
+            <a:extLst>
+              <a:ext uri="{28A0092B-C50C-407E-A947-70E740481C1C}">
+                <a14:useLocalDpi xmlns:a14="http://schemas.microsoft.com/office/drawing/2010/main" val="0"/>
+              </a:ext>
+            </a:extLst>
+          </a:blip>
+          <a:stretch>
+            <a:fillRect/>
+          </a:stretch>
+        </p:blipFill>
+        <p:spPr>
+          <a:xfrm>
+            <a:off x="255029" y="508515"/>
+            <a:ext cx="9144018" cy="2743205"/>
+          </a:xfrm>
+          <a:prstGeom prst="rect">
+            <a:avLst/>
+          </a:prstGeom>
+        </p:spPr>
+      </p:pic>
+      <p:pic>
+        <p:nvPicPr>
+          <p:cNvPr id="5" name="Picture 4">
+            <a:extLst>
+              <a:ext uri="{FF2B5EF4-FFF2-40B4-BE49-F238E27FC236}">
+                <a16:creationId xmlns:a16="http://schemas.microsoft.com/office/drawing/2014/main" id="{E164F2E6-2B8F-705E-161A-4D378B681A4F}"/>
+              </a:ext>
+            </a:extLst>
+          </p:cNvPr>
+          <p:cNvPicPr>
+            <a:picLocks noChangeAspect="1"/>
+          </p:cNvPicPr>
+          <p:nvPr/>
+        </p:nvPicPr>
+        <p:blipFill>
+          <a:blip r:embed="rId3">
+            <a:extLst>
+              <a:ext uri="{28A0092B-C50C-407E-A947-70E740481C1C}">
+                <a14:useLocalDpi xmlns:a14="http://schemas.microsoft.com/office/drawing/2010/main" val="0"/>
+              </a:ext>
+            </a:extLst>
+          </a:blip>
+          <a:stretch>
+            <a:fillRect/>
+          </a:stretch>
+        </p:blipFill>
+        <p:spPr>
+          <a:xfrm>
+            <a:off x="377037" y="3442998"/>
+            <a:ext cx="9144018" cy="2743205"/>
+          </a:xfrm>
+          <a:prstGeom prst="rect">
+            <a:avLst/>
+          </a:prstGeom>
+        </p:spPr>
+      </p:pic>
+      <p:sp>
+        <p:nvSpPr>
+          <p:cNvPr id="6" name="TextBox 5">
+            <a:extLst>
+              <a:ext uri="{FF2B5EF4-FFF2-40B4-BE49-F238E27FC236}">
+                <a16:creationId xmlns:a16="http://schemas.microsoft.com/office/drawing/2014/main" id="{78A5646C-278B-4D1B-2771-DDE27AC8917E}"/>
+              </a:ext>
+            </a:extLst>
+          </p:cNvPr>
+          <p:cNvSpPr txBox="1"/>
+          <p:nvPr/>
+        </p:nvSpPr>
+        <p:spPr>
+          <a:xfrm>
+            <a:off x="9196232" y="1436914"/>
+            <a:ext cx="2084478" cy="369332"/>
+          </a:xfrm>
+          <a:prstGeom prst="rect">
+            <a:avLst/>
+          </a:prstGeom>
+          <a:noFill/>
+        </p:spPr>
+        <p:txBody>
+          <a:bodyPr wrap="square" rtlCol="0">
+            <a:spAutoFit/>
+          </a:bodyPr>
+          <a:lstStyle/>
+          <a:p>
+            <a:r>
+              <a:rPr lang="en-US" dirty="0"/>
+              <a:t>Forest Edge 1</a:t>
+            </a:r>
+          </a:p>
+        </p:txBody>
+      </p:sp>
+      <p:sp>
+        <p:nvSpPr>
+          <p:cNvPr id="7" name="TextBox 6">
+            <a:extLst>
+              <a:ext uri="{FF2B5EF4-FFF2-40B4-BE49-F238E27FC236}">
+                <a16:creationId xmlns:a16="http://schemas.microsoft.com/office/drawing/2014/main" id="{A2FB81A5-2CCD-A007-60ED-10CD05A60A43}"/>
+              </a:ext>
+            </a:extLst>
+          </p:cNvPr>
+          <p:cNvSpPr txBox="1"/>
+          <p:nvPr/>
+        </p:nvSpPr>
+        <p:spPr>
+          <a:xfrm>
+            <a:off x="9329971" y="4180119"/>
+            <a:ext cx="2084478" cy="369332"/>
+          </a:xfrm>
+          <a:prstGeom prst="rect">
+            <a:avLst/>
+          </a:prstGeom>
+          <a:noFill/>
+        </p:spPr>
+        <p:txBody>
+          <a:bodyPr wrap="square" rtlCol="0">
+            <a:spAutoFit/>
+          </a:bodyPr>
+          <a:lstStyle/>
+          <a:p>
+            <a:r>
+              <a:rPr lang="en-US" dirty="0"/>
+              <a:t>Forest Edge 2</a:t>
+            </a:r>
+          </a:p>
+        </p:txBody>
+      </p:sp>
+    </p:spTree>
+    <p:extLst>
+      <p:ext uri="{BB962C8B-B14F-4D97-AF65-F5344CB8AC3E}">
+        <p14:creationId xmlns:p14="http://schemas.microsoft.com/office/powerpoint/2010/main" val="2657568891"/>
+      </p:ext>
+    </p:extLst>
+  </p:cSld>
+  <p:clrMapOvr>
+    <a:masterClrMapping/>
+  </p:clrMapOvr>
+</p:sld>
+</file>
+
+<file path=ppt/slides/slide12.xml><?xml version="1.0" encoding="utf-8"?>
+<p:sld xmlns:a="http://schemas.openxmlformats.org/drawingml/2006/main" xmlns:r="http://schemas.openxmlformats.org/officeDocument/2006/relationships" xmlns:p="http://schemas.openxmlformats.org/presentationml/2006/main">
+  <p:cSld>
+    <p:spTree>
+      <p:nvGrpSpPr>
+        <p:cNvPr id="1" name=""/>
+        <p:cNvGrpSpPr/>
+        <p:nvPr/>
+      </p:nvGrpSpPr>
+      <p:grpSpPr>
+        <a:xfrm>
+          <a:off x="0" y="0"/>
+          <a:ext cx="0" cy="0"/>
+          <a:chOff x="0" y="0"/>
+          <a:chExt cx="0" cy="0"/>
+        </a:xfrm>
+      </p:grpSpPr>
+      <p:pic>
+        <p:nvPicPr>
+          <p:cNvPr id="3" name="Picture 2">
+            <a:extLst>
+              <a:ext uri="{FF2B5EF4-FFF2-40B4-BE49-F238E27FC236}">
+                <a16:creationId xmlns:a16="http://schemas.microsoft.com/office/drawing/2014/main" id="{5F2C3A72-EEDF-92CE-F165-D4E9E7798135}"/>
+              </a:ext>
+            </a:extLst>
+          </p:cNvPr>
+          <p:cNvPicPr>
+            <a:picLocks noChangeAspect="1"/>
+          </p:cNvPicPr>
+          <p:nvPr/>
+        </p:nvPicPr>
+        <p:blipFill>
+          <a:blip r:embed="rId2">
+            <a:extLst>
+              <a:ext uri="{28A0092B-C50C-407E-A947-70E740481C1C}">
+                <a14:useLocalDpi xmlns:a14="http://schemas.microsoft.com/office/drawing/2010/main" val="0"/>
+              </a:ext>
+            </a:extLst>
+          </a:blip>
+          <a:stretch>
+            <a:fillRect/>
+          </a:stretch>
+        </p:blipFill>
+        <p:spPr>
+          <a:xfrm>
+            <a:off x="329673" y="592491"/>
+            <a:ext cx="9144018" cy="2743205"/>
+          </a:xfrm>
+          <a:prstGeom prst="rect">
+            <a:avLst/>
+          </a:prstGeom>
+        </p:spPr>
+      </p:pic>
+      <p:pic>
+        <p:nvPicPr>
+          <p:cNvPr id="5" name="Picture 4">
+            <a:extLst>
+              <a:ext uri="{FF2B5EF4-FFF2-40B4-BE49-F238E27FC236}">
+                <a16:creationId xmlns:a16="http://schemas.microsoft.com/office/drawing/2014/main" id="{DFFE3D01-D7FA-59E8-C62B-6A7E3EE6BAF3}"/>
+              </a:ext>
+            </a:extLst>
+          </p:cNvPr>
+          <p:cNvPicPr>
+            <a:picLocks noChangeAspect="1"/>
+          </p:cNvPicPr>
+          <p:nvPr/>
+        </p:nvPicPr>
+        <p:blipFill>
+          <a:blip r:embed="rId3">
+            <a:extLst>
+              <a:ext uri="{28A0092B-C50C-407E-A947-70E740481C1C}">
+                <a14:useLocalDpi xmlns:a14="http://schemas.microsoft.com/office/drawing/2010/main" val="0"/>
+              </a:ext>
+            </a:extLst>
+          </a:blip>
+          <a:stretch>
+            <a:fillRect/>
+          </a:stretch>
+        </p:blipFill>
+        <p:spPr>
+          <a:xfrm>
+            <a:off x="329673" y="3625650"/>
+            <a:ext cx="9262196" cy="2778658"/>
+          </a:xfrm>
+          <a:prstGeom prst="rect">
+            <a:avLst/>
+          </a:prstGeom>
+        </p:spPr>
+      </p:pic>
+      <p:sp>
+        <p:nvSpPr>
+          <p:cNvPr id="6" name="TextBox 5">
+            <a:extLst>
+              <a:ext uri="{FF2B5EF4-FFF2-40B4-BE49-F238E27FC236}">
+                <a16:creationId xmlns:a16="http://schemas.microsoft.com/office/drawing/2014/main" id="{67891FED-D127-DAC4-F315-46A62969F741}"/>
+              </a:ext>
+            </a:extLst>
+          </p:cNvPr>
+          <p:cNvSpPr txBox="1"/>
+          <p:nvPr/>
+        </p:nvSpPr>
+        <p:spPr>
+          <a:xfrm>
+            <a:off x="9196232" y="1436914"/>
+            <a:ext cx="2084478" cy="369332"/>
+          </a:xfrm>
+          <a:prstGeom prst="rect">
+            <a:avLst/>
+          </a:prstGeom>
+          <a:noFill/>
+        </p:spPr>
+        <p:txBody>
+          <a:bodyPr wrap="square" rtlCol="0">
+            <a:spAutoFit/>
+          </a:bodyPr>
+          <a:lstStyle/>
+          <a:p>
+            <a:r>
+              <a:rPr lang="en-US" dirty="0"/>
+              <a:t>Forest Edge 3</a:t>
+            </a:r>
+          </a:p>
+        </p:txBody>
+      </p:sp>
+      <p:sp>
+        <p:nvSpPr>
+          <p:cNvPr id="7" name="TextBox 6">
+            <a:extLst>
+              <a:ext uri="{FF2B5EF4-FFF2-40B4-BE49-F238E27FC236}">
+                <a16:creationId xmlns:a16="http://schemas.microsoft.com/office/drawing/2014/main" id="{1A033042-437B-B754-2D1A-5C4872245211}"/>
+              </a:ext>
+            </a:extLst>
+          </p:cNvPr>
+          <p:cNvSpPr txBox="1"/>
+          <p:nvPr/>
+        </p:nvSpPr>
+        <p:spPr>
+          <a:xfrm>
+            <a:off x="9473691" y="4341845"/>
+            <a:ext cx="2084478" cy="369332"/>
+          </a:xfrm>
+          <a:prstGeom prst="rect">
+            <a:avLst/>
+          </a:prstGeom>
+          <a:noFill/>
+        </p:spPr>
+        <p:txBody>
+          <a:bodyPr wrap="square" rtlCol="0">
+            <a:spAutoFit/>
+          </a:bodyPr>
+          <a:lstStyle/>
+          <a:p>
+            <a:r>
+              <a:rPr lang="en-US" dirty="0"/>
+              <a:t>Forest Edge 4</a:t>
+            </a:r>
+          </a:p>
+        </p:txBody>
+      </p:sp>
+    </p:spTree>
+    <p:extLst>
+      <p:ext uri="{BB962C8B-B14F-4D97-AF65-F5344CB8AC3E}">
+        <p14:creationId xmlns:p14="http://schemas.microsoft.com/office/powerpoint/2010/main" val="2195866900"/>
+      </p:ext>
+    </p:extLst>
+  </p:cSld>
+  <p:clrMapOvr>
+    <a:masterClrMapping/>
+  </p:clrMapOvr>
+</p:sld>
+</file>
+
+<file path=ppt/slides/slide13.xml><?xml version="1.0" encoding="utf-8"?>
+<p:sld xmlns:a="http://schemas.openxmlformats.org/drawingml/2006/main" xmlns:r="http://schemas.openxmlformats.org/officeDocument/2006/relationships" xmlns:p="http://schemas.openxmlformats.org/presentationml/2006/main">
+  <p:cSld>
+    <p:spTree>
+      <p:nvGrpSpPr>
+        <p:cNvPr id="1" name=""/>
+        <p:cNvGrpSpPr/>
+        <p:nvPr/>
+      </p:nvGrpSpPr>
+      <p:grpSpPr>
+        <a:xfrm>
+          <a:off x="0" y="0"/>
+          <a:ext cx="0" cy="0"/>
+          <a:chOff x="0" y="0"/>
+          <a:chExt cx="0" cy="0"/>
+        </a:xfrm>
+      </p:grpSpPr>
+      <p:pic>
+        <p:nvPicPr>
+          <p:cNvPr id="3" name="Picture 2">
+            <a:extLst>
+              <a:ext uri="{FF2B5EF4-FFF2-40B4-BE49-F238E27FC236}">
+                <a16:creationId xmlns:a16="http://schemas.microsoft.com/office/drawing/2014/main" id="{CC91023D-3A86-682F-F0FC-B445870B9BAC}"/>
+              </a:ext>
+            </a:extLst>
+          </p:cNvPr>
+          <p:cNvPicPr>
+            <a:picLocks noChangeAspect="1"/>
+          </p:cNvPicPr>
+          <p:nvPr/>
+        </p:nvPicPr>
+        <p:blipFill>
+          <a:blip r:embed="rId2">
+            <a:extLst>
+              <a:ext uri="{28A0092B-C50C-407E-A947-70E740481C1C}">
+                <a14:useLocalDpi xmlns:a14="http://schemas.microsoft.com/office/drawing/2010/main" val="0"/>
+              </a:ext>
+            </a:extLst>
+          </a:blip>
+          <a:stretch>
+            <a:fillRect/>
+          </a:stretch>
+        </p:blipFill>
+        <p:spPr>
+          <a:xfrm>
+            <a:off x="245697" y="377886"/>
+            <a:ext cx="9144018" cy="2743205"/>
+          </a:xfrm>
+          <a:prstGeom prst="rect">
+            <a:avLst/>
+          </a:prstGeom>
+        </p:spPr>
+      </p:pic>
+      <p:pic>
+        <p:nvPicPr>
+          <p:cNvPr id="5" name="Picture 4">
+            <a:extLst>
+              <a:ext uri="{FF2B5EF4-FFF2-40B4-BE49-F238E27FC236}">
+                <a16:creationId xmlns:a16="http://schemas.microsoft.com/office/drawing/2014/main" id="{C227C2DE-C7F1-051C-8A0A-19D1CA09AA34}"/>
+              </a:ext>
+            </a:extLst>
+          </p:cNvPr>
+          <p:cNvPicPr>
+            <a:picLocks noChangeAspect="1"/>
+          </p:cNvPicPr>
+          <p:nvPr/>
+        </p:nvPicPr>
+        <p:blipFill>
+          <a:blip r:embed="rId3">
+            <a:extLst>
+              <a:ext uri="{28A0092B-C50C-407E-A947-70E740481C1C}">
+                <a14:useLocalDpi xmlns:a14="http://schemas.microsoft.com/office/drawing/2010/main" val="0"/>
+              </a:ext>
+            </a:extLst>
+          </a:blip>
+          <a:stretch>
+            <a:fillRect/>
+          </a:stretch>
+        </p:blipFill>
+        <p:spPr>
+          <a:xfrm>
+            <a:off x="367705" y="3429000"/>
+            <a:ext cx="9144018" cy="2743205"/>
+          </a:xfrm>
+          <a:prstGeom prst="rect">
+            <a:avLst/>
+          </a:prstGeom>
+        </p:spPr>
+      </p:pic>
+      <p:sp>
+        <p:nvSpPr>
+          <p:cNvPr id="8" name="TextBox 7">
+            <a:extLst>
+              <a:ext uri="{FF2B5EF4-FFF2-40B4-BE49-F238E27FC236}">
+                <a16:creationId xmlns:a16="http://schemas.microsoft.com/office/drawing/2014/main" id="{6C19A8F3-24F8-EA31-4F81-5B56123329B2}"/>
+              </a:ext>
+            </a:extLst>
+          </p:cNvPr>
+          <p:cNvSpPr txBox="1"/>
+          <p:nvPr/>
+        </p:nvSpPr>
+        <p:spPr>
+          <a:xfrm>
+            <a:off x="9130917" y="1278294"/>
+            <a:ext cx="2084478" cy="369332"/>
+          </a:xfrm>
+          <a:prstGeom prst="rect">
+            <a:avLst/>
+          </a:prstGeom>
+          <a:noFill/>
+        </p:spPr>
+        <p:txBody>
+          <a:bodyPr wrap="square" rtlCol="0">
+            <a:spAutoFit/>
+          </a:bodyPr>
+          <a:lstStyle/>
+          <a:p>
+            <a:r>
+              <a:rPr lang="en-US" dirty="0"/>
+              <a:t>Unmanaged Lawn 1</a:t>
+            </a:r>
+          </a:p>
+        </p:txBody>
+      </p:sp>
+      <p:sp>
+        <p:nvSpPr>
+          <p:cNvPr id="9" name="TextBox 8">
+            <a:extLst>
+              <a:ext uri="{FF2B5EF4-FFF2-40B4-BE49-F238E27FC236}">
+                <a16:creationId xmlns:a16="http://schemas.microsoft.com/office/drawing/2014/main" id="{C05787EF-36FE-89D4-C78A-0F334E0A0621}"/>
+              </a:ext>
+            </a:extLst>
+          </p:cNvPr>
+          <p:cNvSpPr txBox="1"/>
+          <p:nvPr/>
+        </p:nvSpPr>
+        <p:spPr>
+          <a:xfrm>
+            <a:off x="9268417" y="4239990"/>
+            <a:ext cx="2084478" cy="369332"/>
+          </a:xfrm>
+          <a:prstGeom prst="rect">
+            <a:avLst/>
+          </a:prstGeom>
+          <a:noFill/>
+        </p:spPr>
+        <p:txBody>
+          <a:bodyPr wrap="square" rtlCol="0">
+            <a:spAutoFit/>
+          </a:bodyPr>
+          <a:lstStyle/>
+          <a:p>
+            <a:r>
+              <a:rPr lang="en-US" dirty="0"/>
+              <a:t>Unmanaged Lawn 2</a:t>
+            </a:r>
+          </a:p>
+        </p:txBody>
+      </p:sp>
+    </p:spTree>
+    <p:extLst>
+      <p:ext uri="{BB962C8B-B14F-4D97-AF65-F5344CB8AC3E}">
+        <p14:creationId xmlns:p14="http://schemas.microsoft.com/office/powerpoint/2010/main" val="3807264440"/>
+      </p:ext>
+    </p:extLst>
+  </p:cSld>
+  <p:clrMapOvr>
+    <a:masterClrMapping/>
+  </p:clrMapOvr>
+</p:sld>
+</file>
+
+<file path=ppt/slides/slide14.xml><?xml version="1.0" encoding="utf-8"?>
+<p:sld xmlns:a="http://schemas.openxmlformats.org/drawingml/2006/main" xmlns:r="http://schemas.openxmlformats.org/officeDocument/2006/relationships" xmlns:p="http://schemas.openxmlformats.org/presentationml/2006/main">
+  <p:cSld>
+    <p:spTree>
+      <p:nvGrpSpPr>
+        <p:cNvPr id="1" name=""/>
+        <p:cNvGrpSpPr/>
+        <p:nvPr/>
+      </p:nvGrpSpPr>
+      <p:grpSpPr>
+        <a:xfrm>
+          <a:off x="0" y="0"/>
+          <a:ext cx="0" cy="0"/>
+          <a:chOff x="0" y="0"/>
+          <a:chExt cx="0" cy="0"/>
+        </a:xfrm>
+      </p:grpSpPr>
+      <p:pic>
+        <p:nvPicPr>
+          <p:cNvPr id="2" name="Picture 1">
+            <a:extLst>
+              <a:ext uri="{FF2B5EF4-FFF2-40B4-BE49-F238E27FC236}">
+                <a16:creationId xmlns:a16="http://schemas.microsoft.com/office/drawing/2014/main" id="{79C6C23A-B1A1-C494-C19F-77AE66B90279}"/>
+              </a:ext>
+            </a:extLst>
+          </p:cNvPr>
+          <p:cNvPicPr>
+            <a:picLocks noChangeAspect="1"/>
+          </p:cNvPicPr>
+          <p:nvPr/>
+        </p:nvPicPr>
+        <p:blipFill>
+          <a:blip r:embed="rId2">
+            <a:extLst>
+              <a:ext uri="{28A0092B-C50C-407E-A947-70E740481C1C}">
+                <a14:useLocalDpi xmlns:a14="http://schemas.microsoft.com/office/drawing/2010/main" val="0"/>
+              </a:ext>
+            </a:extLst>
+          </a:blip>
+          <a:stretch>
+            <a:fillRect/>
+          </a:stretch>
+        </p:blipFill>
+        <p:spPr>
+          <a:xfrm>
+            <a:off x="339003" y="779105"/>
+            <a:ext cx="9144018" cy="2743205"/>
+          </a:xfrm>
+          <a:prstGeom prst="rect">
+            <a:avLst/>
+          </a:prstGeom>
+        </p:spPr>
+      </p:pic>
+      <p:pic>
+        <p:nvPicPr>
+          <p:cNvPr id="4" name="Picture 3">
+            <a:extLst>
+              <a:ext uri="{FF2B5EF4-FFF2-40B4-BE49-F238E27FC236}">
+                <a16:creationId xmlns:a16="http://schemas.microsoft.com/office/drawing/2014/main" id="{0EF13D93-BFC0-D846-66AE-5AFB82A38CAD}"/>
+              </a:ext>
+            </a:extLst>
+          </p:cNvPr>
+          <p:cNvPicPr>
+            <a:picLocks noChangeAspect="1"/>
+          </p:cNvPicPr>
+          <p:nvPr/>
+        </p:nvPicPr>
+        <p:blipFill>
+          <a:blip r:embed="rId3">
+            <a:extLst>
+              <a:ext uri="{28A0092B-C50C-407E-A947-70E740481C1C}">
+                <a14:useLocalDpi xmlns:a14="http://schemas.microsoft.com/office/drawing/2010/main" val="0"/>
+              </a:ext>
+            </a:extLst>
+          </a:blip>
+          <a:stretch>
+            <a:fillRect/>
+          </a:stretch>
+        </p:blipFill>
+        <p:spPr>
+          <a:xfrm>
+            <a:off x="404317" y="3662262"/>
+            <a:ext cx="9144018" cy="2743205"/>
+          </a:xfrm>
+          <a:prstGeom prst="rect">
+            <a:avLst/>
+          </a:prstGeom>
+        </p:spPr>
+      </p:pic>
+      <p:sp>
+        <p:nvSpPr>
+          <p:cNvPr id="5" name="TextBox 4">
+            <a:extLst>
+              <a:ext uri="{FF2B5EF4-FFF2-40B4-BE49-F238E27FC236}">
+                <a16:creationId xmlns:a16="http://schemas.microsoft.com/office/drawing/2014/main" id="{462A9771-11E9-2080-FBD9-221D8F9BBA3A}"/>
+              </a:ext>
+            </a:extLst>
+          </p:cNvPr>
+          <p:cNvSpPr txBox="1"/>
+          <p:nvPr/>
+        </p:nvSpPr>
+        <p:spPr>
+          <a:xfrm>
+            <a:off x="9130917" y="1278294"/>
+            <a:ext cx="2084478" cy="369332"/>
+          </a:xfrm>
+          <a:prstGeom prst="rect">
+            <a:avLst/>
+          </a:prstGeom>
+          <a:noFill/>
+        </p:spPr>
+        <p:txBody>
+          <a:bodyPr wrap="square" rtlCol="0">
+            <a:spAutoFit/>
+          </a:bodyPr>
+          <a:lstStyle/>
+          <a:p>
+            <a:r>
+              <a:rPr lang="en-US" dirty="0"/>
+              <a:t>Unmanaged Lawn 3</a:t>
+            </a:r>
+          </a:p>
+        </p:txBody>
+      </p:sp>
+      <p:sp>
+        <p:nvSpPr>
+          <p:cNvPr id="6" name="TextBox 5">
+            <a:extLst>
+              <a:ext uri="{FF2B5EF4-FFF2-40B4-BE49-F238E27FC236}">
+                <a16:creationId xmlns:a16="http://schemas.microsoft.com/office/drawing/2014/main" id="{048C2BC0-BF37-2907-B511-9E0615FE311C}"/>
+              </a:ext>
+            </a:extLst>
+          </p:cNvPr>
+          <p:cNvSpPr txBox="1"/>
+          <p:nvPr/>
+        </p:nvSpPr>
+        <p:spPr>
+          <a:xfrm>
+            <a:off x="9264656" y="4435151"/>
+            <a:ext cx="2084478" cy="646331"/>
+          </a:xfrm>
+          <a:prstGeom prst="rect">
+            <a:avLst/>
+          </a:prstGeom>
+          <a:noFill/>
+        </p:spPr>
+        <p:txBody>
+          <a:bodyPr wrap="square" rtlCol="0">
+            <a:spAutoFit/>
+          </a:bodyPr>
+          <a:lstStyle/>
+          <a:p>
+            <a:r>
+              <a:rPr lang="en-US" dirty="0"/>
+              <a:t>Managed Lawn 1</a:t>
+            </a:r>
+          </a:p>
+          <a:p>
+            <a:r>
+              <a:rPr lang="en-US" dirty="0"/>
+              <a:t>(only ML collar)</a:t>
+            </a:r>
+          </a:p>
+        </p:txBody>
+      </p:sp>
+    </p:spTree>
+    <p:extLst>
+      <p:ext uri="{BB962C8B-B14F-4D97-AF65-F5344CB8AC3E}">
+        <p14:creationId xmlns:p14="http://schemas.microsoft.com/office/powerpoint/2010/main" val="3055562563"/>
+      </p:ext>
+    </p:extLst>
+  </p:cSld>
+  <p:clrMapOvr>
+    <a:masterClrMapping/>
+  </p:clrMapOvr>
+</p:sld>
+</file>
+
+<file path=ppt/slides/slide15.xml><?xml version="1.0" encoding="utf-8"?>
+<p:sld xmlns:a="http://schemas.openxmlformats.org/drawingml/2006/main" xmlns:r="http://schemas.openxmlformats.org/officeDocument/2006/relationships" xmlns:p="http://schemas.openxmlformats.org/presentationml/2006/main">
+  <p:cSld>
+    <p:spTree>
+      <p:nvGrpSpPr>
+        <p:cNvPr id="1" name=""/>
+        <p:cNvGrpSpPr/>
+        <p:nvPr/>
+      </p:nvGrpSpPr>
+      <p:grpSpPr>
+        <a:xfrm>
+          <a:off x="0" y="0"/>
+          <a:ext cx="0" cy="0"/>
+          <a:chOff x="0" y="0"/>
+          <a:chExt cx="0" cy="0"/>
+        </a:xfrm>
+      </p:grpSpPr>
+      <p:pic>
+        <p:nvPicPr>
+          <p:cNvPr id="5" name="Picture 4">
+            <a:extLst>
+              <a:ext uri="{FF2B5EF4-FFF2-40B4-BE49-F238E27FC236}">
+                <a16:creationId xmlns:a16="http://schemas.microsoft.com/office/drawing/2014/main" id="{1901CDD9-1F26-9494-4CB8-C72C86B0E0EC}"/>
+              </a:ext>
+            </a:extLst>
+          </p:cNvPr>
+          <p:cNvPicPr>
+            <a:picLocks noChangeAspect="1"/>
+          </p:cNvPicPr>
+          <p:nvPr/>
+        </p:nvPicPr>
+        <p:blipFill>
+          <a:blip r:embed="rId2">
+            <a:extLst>
+              <a:ext uri="{28A0092B-C50C-407E-A947-70E740481C1C}">
+                <a14:useLocalDpi xmlns:a14="http://schemas.microsoft.com/office/drawing/2010/main" val="0"/>
+              </a:ext>
+            </a:extLst>
+          </a:blip>
+          <a:stretch>
+            <a:fillRect/>
+          </a:stretch>
+        </p:blipFill>
+        <p:spPr>
+          <a:xfrm>
+            <a:off x="422979" y="489855"/>
+            <a:ext cx="9144018" cy="2743205"/>
+          </a:xfrm>
+          <a:prstGeom prst="rect">
+            <a:avLst/>
+          </a:prstGeom>
+        </p:spPr>
+      </p:pic>
+      <p:pic>
+        <p:nvPicPr>
+          <p:cNvPr id="7" name="Picture 6">
+            <a:extLst>
+              <a:ext uri="{FF2B5EF4-FFF2-40B4-BE49-F238E27FC236}">
+                <a16:creationId xmlns:a16="http://schemas.microsoft.com/office/drawing/2014/main" id="{B6B3643C-D821-F6B4-0B1B-A8E37C8A3451}"/>
+              </a:ext>
+            </a:extLst>
+          </p:cNvPr>
+          <p:cNvPicPr>
+            <a:picLocks noChangeAspect="1"/>
+          </p:cNvPicPr>
+          <p:nvPr/>
+        </p:nvPicPr>
+        <p:blipFill>
+          <a:blip r:embed="rId3">
+            <a:extLst>
+              <a:ext uri="{28A0092B-C50C-407E-A947-70E740481C1C}">
+                <a14:useLocalDpi xmlns:a14="http://schemas.microsoft.com/office/drawing/2010/main" val="0"/>
+              </a:ext>
+            </a:extLst>
+          </a:blip>
+          <a:stretch>
+            <a:fillRect/>
+          </a:stretch>
+        </p:blipFill>
+        <p:spPr>
+          <a:xfrm>
+            <a:off x="422979" y="3429000"/>
+            <a:ext cx="9144018" cy="2743205"/>
+          </a:xfrm>
+          <a:prstGeom prst="rect">
+            <a:avLst/>
+          </a:prstGeom>
+        </p:spPr>
+      </p:pic>
+      <p:sp>
+        <p:nvSpPr>
+          <p:cNvPr id="8" name="TextBox 7">
+            <a:extLst>
+              <a:ext uri="{FF2B5EF4-FFF2-40B4-BE49-F238E27FC236}">
+                <a16:creationId xmlns:a16="http://schemas.microsoft.com/office/drawing/2014/main" id="{EE3F072D-6C00-E561-51AE-75E4F6306115}"/>
+              </a:ext>
+            </a:extLst>
+          </p:cNvPr>
+          <p:cNvSpPr txBox="1"/>
+          <p:nvPr/>
+        </p:nvSpPr>
+        <p:spPr>
+          <a:xfrm>
+            <a:off x="9130917" y="1278294"/>
+            <a:ext cx="2084478" cy="369332"/>
+          </a:xfrm>
+          <a:prstGeom prst="rect">
+            <a:avLst/>
+          </a:prstGeom>
+          <a:noFill/>
+        </p:spPr>
+        <p:txBody>
+          <a:bodyPr wrap="square" rtlCol="0">
+            <a:spAutoFit/>
+          </a:bodyPr>
+          <a:lstStyle/>
+          <a:p>
+            <a:r>
+              <a:rPr lang="en-US" dirty="0"/>
+              <a:t>Hot Lawn 1</a:t>
+            </a:r>
+          </a:p>
+        </p:txBody>
+      </p:sp>
+      <p:sp>
+        <p:nvSpPr>
+          <p:cNvPr id="9" name="TextBox 8">
+            <a:extLst>
+              <a:ext uri="{FF2B5EF4-FFF2-40B4-BE49-F238E27FC236}">
+                <a16:creationId xmlns:a16="http://schemas.microsoft.com/office/drawing/2014/main" id="{674A9693-B9CF-321E-3828-0D4B5C5B6488}"/>
+              </a:ext>
+            </a:extLst>
+          </p:cNvPr>
+          <p:cNvSpPr txBox="1"/>
+          <p:nvPr/>
+        </p:nvSpPr>
+        <p:spPr>
+          <a:xfrm>
+            <a:off x="9329970" y="4155233"/>
+            <a:ext cx="2084478" cy="369332"/>
+          </a:xfrm>
+          <a:prstGeom prst="rect">
+            <a:avLst/>
+          </a:prstGeom>
+          <a:noFill/>
+        </p:spPr>
+        <p:txBody>
+          <a:bodyPr wrap="square" rtlCol="0">
+            <a:spAutoFit/>
+          </a:bodyPr>
+          <a:lstStyle/>
+          <a:p>
+            <a:r>
+              <a:rPr lang="en-US" dirty="0"/>
+              <a:t>Hot Lawn 2</a:t>
+            </a:r>
+          </a:p>
+        </p:txBody>
+      </p:sp>
+    </p:spTree>
+    <p:extLst>
+      <p:ext uri="{BB962C8B-B14F-4D97-AF65-F5344CB8AC3E}">
+        <p14:creationId xmlns:p14="http://schemas.microsoft.com/office/powerpoint/2010/main" val="3510130817"/>
+      </p:ext>
+    </p:extLst>
+  </p:cSld>
+  <p:clrMapOvr>
+    <a:masterClrMapping/>
+  </p:clrMapOvr>
+</p:sld>
+</file>
+
+<file path=ppt/slides/slide16.xml><?xml version="1.0" encoding="utf-8"?>
+<p:sld xmlns:a="http://schemas.openxmlformats.org/drawingml/2006/main" xmlns:r="http://schemas.openxmlformats.org/officeDocument/2006/relationships" xmlns:p="http://schemas.openxmlformats.org/presentationml/2006/main">
+  <p:cSld>
+    <p:spTree>
+      <p:nvGrpSpPr>
+        <p:cNvPr id="1" name=""/>
+        <p:cNvGrpSpPr/>
+        <p:nvPr/>
+      </p:nvGrpSpPr>
+      <p:grpSpPr>
+        <a:xfrm>
+          <a:off x="0" y="0"/>
+          <a:ext cx="0" cy="0"/>
+          <a:chOff x="0" y="0"/>
+          <a:chExt cx="0" cy="0"/>
+        </a:xfrm>
+      </p:grpSpPr>
+      <p:pic>
+        <p:nvPicPr>
+          <p:cNvPr id="3" name="Picture 2">
+            <a:extLst>
+              <a:ext uri="{FF2B5EF4-FFF2-40B4-BE49-F238E27FC236}">
+                <a16:creationId xmlns:a16="http://schemas.microsoft.com/office/drawing/2014/main" id="{E87285E4-276D-423D-FBD0-3E50F62F9E78}"/>
+              </a:ext>
+            </a:extLst>
+          </p:cNvPr>
+          <p:cNvPicPr>
+            <a:picLocks noChangeAspect="1"/>
+          </p:cNvPicPr>
+          <p:nvPr/>
+        </p:nvPicPr>
+        <p:blipFill>
+          <a:blip r:embed="rId2">
+            <a:extLst>
+              <a:ext uri="{28A0092B-C50C-407E-A947-70E740481C1C}">
+                <a14:useLocalDpi xmlns:a14="http://schemas.microsoft.com/office/drawing/2010/main" val="0"/>
+              </a:ext>
+            </a:extLst>
+          </a:blip>
+          <a:stretch>
+            <a:fillRect/>
+          </a:stretch>
+        </p:blipFill>
+        <p:spPr>
+          <a:xfrm>
+            <a:off x="339003" y="685795"/>
+            <a:ext cx="9144018" cy="2743205"/>
+          </a:xfrm>
+          <a:prstGeom prst="rect">
+            <a:avLst/>
+          </a:prstGeom>
+        </p:spPr>
+      </p:pic>
+      <p:pic>
+        <p:nvPicPr>
+          <p:cNvPr id="5" name="Picture 4">
+            <a:extLst>
+              <a:ext uri="{FF2B5EF4-FFF2-40B4-BE49-F238E27FC236}">
+                <a16:creationId xmlns:a16="http://schemas.microsoft.com/office/drawing/2014/main" id="{A6FFC1FD-F2D3-D414-9BF5-10B830711426}"/>
+              </a:ext>
+            </a:extLst>
+          </p:cNvPr>
+          <p:cNvPicPr>
+            <a:picLocks noChangeAspect="1"/>
+          </p:cNvPicPr>
+          <p:nvPr/>
+        </p:nvPicPr>
+        <p:blipFill>
+          <a:blip r:embed="rId3">
+            <a:extLst>
+              <a:ext uri="{28A0092B-C50C-407E-A947-70E740481C1C}">
+                <a14:useLocalDpi xmlns:a14="http://schemas.microsoft.com/office/drawing/2010/main" val="0"/>
+              </a:ext>
+            </a:extLst>
+          </a:blip>
+          <a:stretch>
+            <a:fillRect/>
+          </a:stretch>
+        </p:blipFill>
+        <p:spPr>
+          <a:xfrm>
+            <a:off x="405028" y="3588327"/>
+            <a:ext cx="9144018" cy="2743205"/>
+          </a:xfrm>
+          <a:prstGeom prst="rect">
+            <a:avLst/>
+          </a:prstGeom>
+        </p:spPr>
+      </p:pic>
+      <p:sp>
+        <p:nvSpPr>
+          <p:cNvPr id="6" name="TextBox 5">
+            <a:extLst>
+              <a:ext uri="{FF2B5EF4-FFF2-40B4-BE49-F238E27FC236}">
+                <a16:creationId xmlns:a16="http://schemas.microsoft.com/office/drawing/2014/main" id="{0FA3CA2D-592D-63C3-48D6-A31545E05982}"/>
+              </a:ext>
+            </a:extLst>
+          </p:cNvPr>
+          <p:cNvSpPr txBox="1"/>
+          <p:nvPr/>
+        </p:nvSpPr>
+        <p:spPr>
+          <a:xfrm>
+            <a:off x="9130917" y="1278294"/>
+            <a:ext cx="2084478" cy="369332"/>
+          </a:xfrm>
+          <a:prstGeom prst="rect">
+            <a:avLst/>
+          </a:prstGeom>
+          <a:noFill/>
+        </p:spPr>
+        <p:txBody>
+          <a:bodyPr wrap="square" rtlCol="0">
+            <a:spAutoFit/>
+          </a:bodyPr>
+          <a:lstStyle/>
+          <a:p>
+            <a:r>
+              <a:rPr lang="en-US" dirty="0"/>
+              <a:t>Hot Lawn 3</a:t>
+            </a:r>
+          </a:p>
+        </p:txBody>
+      </p:sp>
+      <p:sp>
+        <p:nvSpPr>
+          <p:cNvPr id="7" name="TextBox 6">
+            <a:extLst>
+              <a:ext uri="{FF2B5EF4-FFF2-40B4-BE49-F238E27FC236}">
+                <a16:creationId xmlns:a16="http://schemas.microsoft.com/office/drawing/2014/main" id="{04782E17-E8CF-D6C5-F9E3-F48B2FF8DE0B}"/>
+              </a:ext>
+            </a:extLst>
+          </p:cNvPr>
+          <p:cNvSpPr txBox="1"/>
+          <p:nvPr/>
+        </p:nvSpPr>
+        <p:spPr>
+          <a:xfrm>
+            <a:off x="9385953" y="4360506"/>
+            <a:ext cx="2084478" cy="369332"/>
+          </a:xfrm>
+          <a:prstGeom prst="rect">
+            <a:avLst/>
+          </a:prstGeom>
+          <a:noFill/>
+        </p:spPr>
+        <p:txBody>
+          <a:bodyPr wrap="square" rtlCol="0">
+            <a:spAutoFit/>
+          </a:bodyPr>
+          <a:lstStyle/>
+          <a:p>
+            <a:r>
+              <a:rPr lang="en-US" dirty="0"/>
+              <a:t>Hot Lawn 4</a:t>
+            </a:r>
+          </a:p>
+        </p:txBody>
+      </p:sp>
+    </p:spTree>
+    <p:extLst>
+      <p:ext uri="{BB962C8B-B14F-4D97-AF65-F5344CB8AC3E}">
+        <p14:creationId xmlns:p14="http://schemas.microsoft.com/office/powerpoint/2010/main" val="263843568"/>
+      </p:ext>
+    </p:extLst>
+  </p:cSld>
+  <p:clrMapOvr>
+    <a:masterClrMapping/>
+  </p:clrMapOvr>
+</p:sld>
+</file>
+
+<file path=ppt/slides/slide17.xml><?xml version="1.0" encoding="utf-8"?>
+<p:sld xmlns:a="http://schemas.openxmlformats.org/drawingml/2006/main" xmlns:r="http://schemas.openxmlformats.org/officeDocument/2006/relationships" xmlns:p="http://schemas.openxmlformats.org/presentationml/2006/main">
+  <p:cSld>
+    <p:spTree>
+      <p:nvGrpSpPr>
+        <p:cNvPr id="1" name=""/>
+        <p:cNvGrpSpPr/>
+        <p:nvPr/>
+      </p:nvGrpSpPr>
+      <p:grpSpPr>
+        <a:xfrm>
+          <a:off x="0" y="0"/>
+          <a:ext cx="0" cy="0"/>
+          <a:chOff x="0" y="0"/>
+          <a:chExt cx="0" cy="0"/>
+        </a:xfrm>
+      </p:grpSpPr>
+      <p:pic>
+        <p:nvPicPr>
+          <p:cNvPr id="3" name="Picture 2">
+            <a:extLst>
+              <a:ext uri="{FF2B5EF4-FFF2-40B4-BE49-F238E27FC236}">
+                <a16:creationId xmlns:a16="http://schemas.microsoft.com/office/drawing/2014/main" id="{A199C53A-62EB-6A73-ED91-5743CC9EA23F}"/>
+              </a:ext>
+            </a:extLst>
+          </p:cNvPr>
+          <p:cNvPicPr>
+            <a:picLocks noChangeAspect="1"/>
+          </p:cNvPicPr>
+          <p:nvPr/>
+        </p:nvPicPr>
+        <p:blipFill>
+          <a:blip r:embed="rId2">
+            <a:extLst>
+              <a:ext uri="{28A0092B-C50C-407E-A947-70E740481C1C}">
+                <a14:useLocalDpi xmlns:a14="http://schemas.microsoft.com/office/drawing/2010/main" val="0"/>
+              </a:ext>
+            </a:extLst>
+          </a:blip>
+          <a:stretch>
+            <a:fillRect/>
+          </a:stretch>
+        </p:blipFill>
+        <p:spPr>
+          <a:xfrm>
+            <a:off x="265068" y="3512264"/>
+            <a:ext cx="9242825" cy="2772847"/>
+          </a:xfrm>
+          <a:prstGeom prst="rect">
+            <a:avLst/>
+          </a:prstGeom>
+        </p:spPr>
+      </p:pic>
+      <p:pic>
+        <p:nvPicPr>
+          <p:cNvPr id="5" name="Picture 4">
+            <a:extLst>
+              <a:ext uri="{FF2B5EF4-FFF2-40B4-BE49-F238E27FC236}">
+                <a16:creationId xmlns:a16="http://schemas.microsoft.com/office/drawing/2014/main" id="{87A9BF26-2A65-00D0-DFAF-2A43D2ABEE10}"/>
+              </a:ext>
+            </a:extLst>
+          </p:cNvPr>
+          <p:cNvPicPr>
+            <a:picLocks noChangeAspect="1"/>
+          </p:cNvPicPr>
+          <p:nvPr/>
+        </p:nvPicPr>
+        <p:blipFill>
+          <a:blip r:embed="rId3">
+            <a:extLst>
+              <a:ext uri="{28A0092B-C50C-407E-A947-70E740481C1C}">
+                <a14:useLocalDpi xmlns:a14="http://schemas.microsoft.com/office/drawing/2010/main" val="0"/>
+              </a:ext>
+            </a:extLst>
+          </a:blip>
+          <a:stretch>
+            <a:fillRect/>
+          </a:stretch>
+        </p:blipFill>
+        <p:spPr>
+          <a:xfrm>
+            <a:off x="265069" y="602532"/>
+            <a:ext cx="9144018" cy="2743205"/>
+          </a:xfrm>
+          <a:prstGeom prst="rect">
+            <a:avLst/>
+          </a:prstGeom>
+        </p:spPr>
+      </p:pic>
+      <p:sp>
+        <p:nvSpPr>
+          <p:cNvPr id="6" name="TextBox 5">
+            <a:extLst>
+              <a:ext uri="{FF2B5EF4-FFF2-40B4-BE49-F238E27FC236}">
+                <a16:creationId xmlns:a16="http://schemas.microsoft.com/office/drawing/2014/main" id="{18F03353-C8A9-F40B-3E54-1E813ACFAE8C}"/>
+              </a:ext>
+            </a:extLst>
+          </p:cNvPr>
+          <p:cNvSpPr txBox="1"/>
+          <p:nvPr/>
+        </p:nvSpPr>
+        <p:spPr>
+          <a:xfrm>
+            <a:off x="9409087" y="1233878"/>
+            <a:ext cx="1539551" cy="1477328"/>
+          </a:xfrm>
+          <a:prstGeom prst="rect">
+            <a:avLst/>
+          </a:prstGeom>
+          <a:noFill/>
+        </p:spPr>
+        <p:txBody>
+          <a:bodyPr wrap="square" rtlCol="0">
+            <a:spAutoFit/>
+          </a:bodyPr>
+          <a:lstStyle/>
+          <a:p>
+            <a:r>
+              <a:rPr lang="en-US" dirty="0"/>
+              <a:t>Savannah 2</a:t>
+            </a:r>
+          </a:p>
+          <a:p>
+            <a:r>
+              <a:rPr lang="en-US" dirty="0"/>
+              <a:t>(this site was always extremely wet and muddy)</a:t>
+            </a:r>
+          </a:p>
+        </p:txBody>
+      </p:sp>
+      <p:sp>
+        <p:nvSpPr>
+          <p:cNvPr id="7" name="TextBox 6">
+            <a:extLst>
+              <a:ext uri="{FF2B5EF4-FFF2-40B4-BE49-F238E27FC236}">
+                <a16:creationId xmlns:a16="http://schemas.microsoft.com/office/drawing/2014/main" id="{4BCC22C2-9706-0FC0-E86F-0AD0919D7060}"/>
+              </a:ext>
+            </a:extLst>
+          </p:cNvPr>
+          <p:cNvSpPr txBox="1"/>
+          <p:nvPr/>
+        </p:nvSpPr>
+        <p:spPr>
+          <a:xfrm>
+            <a:off x="9409087" y="4376057"/>
+            <a:ext cx="2084478" cy="369332"/>
+          </a:xfrm>
+          <a:prstGeom prst="rect">
+            <a:avLst/>
+          </a:prstGeom>
+          <a:noFill/>
+        </p:spPr>
+        <p:txBody>
+          <a:bodyPr wrap="square" rtlCol="0">
+            <a:spAutoFit/>
+          </a:bodyPr>
+          <a:lstStyle/>
+          <a:p>
+            <a:r>
+              <a:rPr lang="en-US" dirty="0"/>
+              <a:t>Savannah 3</a:t>
+            </a:r>
+          </a:p>
+        </p:txBody>
+      </p:sp>
+    </p:spTree>
+    <p:extLst>
+      <p:ext uri="{BB962C8B-B14F-4D97-AF65-F5344CB8AC3E}">
+        <p14:creationId xmlns:p14="http://schemas.microsoft.com/office/powerpoint/2010/main" val="4198907092"/>
+      </p:ext>
+    </p:extLst>
+  </p:cSld>
+  <p:clrMapOvr>
+    <a:masterClrMapping/>
+  </p:clrMapOvr>
+</p:sld>
+</file>
+
 <file path=ppt/slides/slide2.xml><?xml version="1.0" encoding="utf-8"?>
 <p:sld xmlns:a="http://schemas.openxmlformats.org/drawingml/2006/main" xmlns:r="http://schemas.openxmlformats.org/officeDocument/2006/relationships" xmlns:p="http://schemas.openxmlformats.org/presentationml/2006/main">
   <p:cSld>
@@ -3989,7 +5393,15 @@
             <a:pPr algn="ctr"/>
             <a:r>
               <a:rPr lang="en-US" dirty="0"/>
-              <a:t>by Land Type at NYBG</a:t>
+              <a:t>by </a:t>
+            </a:r>
+            <a:r>
+              <a:rPr lang="en-US" b="1" dirty="0"/>
+              <a:t>Land Type </a:t>
+            </a:r>
+            <a:r>
+              <a:rPr lang="en-US" dirty="0"/>
+              <a:t>at NYBG</a:t>
             </a:r>
           </a:p>
         </p:txBody>
@@ -4513,6 +5925,576 @@
     <p:extLst>
       <p:ext uri="{BB962C8B-B14F-4D97-AF65-F5344CB8AC3E}">
         <p14:creationId xmlns:p14="http://schemas.microsoft.com/office/powerpoint/2010/main" val="1901802180"/>
+      </p:ext>
+    </p:extLst>
+  </p:cSld>
+  <p:clrMapOvr>
+    <a:masterClrMapping/>
+  </p:clrMapOvr>
+</p:sld>
+</file>
+
+<file path=ppt/slides/slide7.xml><?xml version="1.0" encoding="utf-8"?>
+<p:sld xmlns:a="http://schemas.openxmlformats.org/drawingml/2006/main" xmlns:r="http://schemas.openxmlformats.org/officeDocument/2006/relationships" xmlns:p="http://schemas.openxmlformats.org/presentationml/2006/main">
+  <p:cSld>
+    <p:spTree>
+      <p:nvGrpSpPr>
+        <p:cNvPr id="1" name=""/>
+        <p:cNvGrpSpPr/>
+        <p:nvPr/>
+      </p:nvGrpSpPr>
+      <p:grpSpPr>
+        <a:xfrm>
+          <a:off x="0" y="0"/>
+          <a:ext cx="0" cy="0"/>
+          <a:chOff x="0" y="0"/>
+          <a:chExt cx="0" cy="0"/>
+        </a:xfrm>
+      </p:grpSpPr>
+      <p:sp>
+        <p:nvSpPr>
+          <p:cNvPr id="3" name="TextBox 2">
+            <a:extLst>
+              <a:ext uri="{FF2B5EF4-FFF2-40B4-BE49-F238E27FC236}">
+                <a16:creationId xmlns:a16="http://schemas.microsoft.com/office/drawing/2014/main" id="{480ACBB3-2778-C750-21B2-98EF334CD11D}"/>
+              </a:ext>
+            </a:extLst>
+          </p:cNvPr>
+          <p:cNvSpPr txBox="1"/>
+          <p:nvPr/>
+        </p:nvSpPr>
+        <p:spPr>
+          <a:xfrm>
+            <a:off x="0" y="318781"/>
+            <a:ext cx="12192000" cy="923330"/>
+          </a:xfrm>
+          <a:prstGeom prst="rect">
+            <a:avLst/>
+          </a:prstGeom>
+          <a:noFill/>
+        </p:spPr>
+        <p:txBody>
+          <a:bodyPr wrap="square" rtlCol="0">
+            <a:spAutoFit/>
+          </a:bodyPr>
+          <a:lstStyle/>
+          <a:p>
+            <a:pPr algn="ctr"/>
+            <a:r>
+              <a:rPr lang="en-US" dirty="0"/>
+              <a:t>Side-by-side comparisons of CO2 flux vs. Soil Temperature (left) and CO2 flux vs. Chamber Temperature (right) </a:t>
+            </a:r>
+          </a:p>
+          <a:p>
+            <a:pPr algn="ctr"/>
+            <a:r>
+              <a:rPr lang="en-US" dirty="0"/>
+              <a:t>by </a:t>
+            </a:r>
+            <a:r>
+              <a:rPr lang="en-US" b="1" dirty="0"/>
+              <a:t>Collar</a:t>
+            </a:r>
+            <a:r>
+              <a:rPr lang="en-US" dirty="0"/>
+              <a:t> at NYBG</a:t>
+            </a:r>
+          </a:p>
+          <a:p>
+            <a:endParaRPr lang="en-US" dirty="0"/>
+          </a:p>
+        </p:txBody>
+      </p:sp>
+      <p:pic>
+        <p:nvPicPr>
+          <p:cNvPr id="5" name="Picture 4">
+            <a:extLst>
+              <a:ext uri="{FF2B5EF4-FFF2-40B4-BE49-F238E27FC236}">
+                <a16:creationId xmlns:a16="http://schemas.microsoft.com/office/drawing/2014/main" id="{B84A5C3E-D1E4-617A-5DF9-99C1030A1C7E}"/>
+              </a:ext>
+            </a:extLst>
+          </p:cNvPr>
+          <p:cNvPicPr>
+            <a:picLocks noChangeAspect="1"/>
+          </p:cNvPicPr>
+          <p:nvPr/>
+        </p:nvPicPr>
+        <p:blipFill>
+          <a:blip r:embed="rId2">
+            <a:extLst>
+              <a:ext uri="{28A0092B-C50C-407E-A947-70E740481C1C}">
+                <a14:useLocalDpi xmlns:a14="http://schemas.microsoft.com/office/drawing/2010/main" val="0"/>
+              </a:ext>
+            </a:extLst>
+          </a:blip>
+          <a:stretch>
+            <a:fillRect/>
+          </a:stretch>
+        </p:blipFill>
+        <p:spPr>
+          <a:xfrm>
+            <a:off x="223934" y="1222790"/>
+            <a:ext cx="7967657" cy="2390298"/>
+          </a:xfrm>
+          <a:prstGeom prst="rect">
+            <a:avLst/>
+          </a:prstGeom>
+        </p:spPr>
+      </p:pic>
+      <p:pic>
+        <p:nvPicPr>
+          <p:cNvPr id="7" name="Picture 6">
+            <a:extLst>
+              <a:ext uri="{FF2B5EF4-FFF2-40B4-BE49-F238E27FC236}">
+                <a16:creationId xmlns:a16="http://schemas.microsoft.com/office/drawing/2014/main" id="{C6CC772D-3414-2AFC-2BD5-BDA9E4938B93}"/>
+              </a:ext>
+            </a:extLst>
+          </p:cNvPr>
+          <p:cNvPicPr>
+            <a:picLocks noChangeAspect="1"/>
+          </p:cNvPicPr>
+          <p:nvPr/>
+        </p:nvPicPr>
+        <p:blipFill>
+          <a:blip r:embed="rId3">
+            <a:extLst>
+              <a:ext uri="{28A0092B-C50C-407E-A947-70E740481C1C}">
+                <a14:useLocalDpi xmlns:a14="http://schemas.microsoft.com/office/drawing/2010/main" val="0"/>
+              </a:ext>
+            </a:extLst>
+          </a:blip>
+          <a:stretch>
+            <a:fillRect/>
+          </a:stretch>
+        </p:blipFill>
+        <p:spPr>
+          <a:xfrm>
+            <a:off x="139502" y="3618615"/>
+            <a:ext cx="8185378" cy="2455613"/>
+          </a:xfrm>
+          <a:prstGeom prst="rect">
+            <a:avLst/>
+          </a:prstGeom>
+        </p:spPr>
+      </p:pic>
+      <p:sp>
+        <p:nvSpPr>
+          <p:cNvPr id="12" name="TextBox 11">
+            <a:extLst>
+              <a:ext uri="{FF2B5EF4-FFF2-40B4-BE49-F238E27FC236}">
+                <a16:creationId xmlns:a16="http://schemas.microsoft.com/office/drawing/2014/main" id="{E0CDE8FA-8B08-A8D9-4D23-969ECD496E97}"/>
+              </a:ext>
+            </a:extLst>
+          </p:cNvPr>
+          <p:cNvSpPr txBox="1"/>
+          <p:nvPr/>
+        </p:nvSpPr>
+        <p:spPr>
+          <a:xfrm>
+            <a:off x="8191591" y="1866122"/>
+            <a:ext cx="2463968" cy="369332"/>
+          </a:xfrm>
+          <a:prstGeom prst="rect">
+            <a:avLst/>
+          </a:prstGeom>
+          <a:noFill/>
+        </p:spPr>
+        <p:txBody>
+          <a:bodyPr wrap="square" rtlCol="0">
+            <a:spAutoFit/>
+          </a:bodyPr>
+          <a:lstStyle/>
+          <a:p>
+            <a:r>
+              <a:rPr lang="en-US" dirty="0"/>
+              <a:t>Tree Pit 1</a:t>
+            </a:r>
+          </a:p>
+        </p:txBody>
+      </p:sp>
+      <p:sp>
+        <p:nvSpPr>
+          <p:cNvPr id="15" name="TextBox 14">
+            <a:extLst>
+              <a:ext uri="{FF2B5EF4-FFF2-40B4-BE49-F238E27FC236}">
+                <a16:creationId xmlns:a16="http://schemas.microsoft.com/office/drawing/2014/main" id="{4392D619-F416-64BE-45D8-F7FB33383A09}"/>
+              </a:ext>
+            </a:extLst>
+          </p:cNvPr>
+          <p:cNvSpPr txBox="1"/>
+          <p:nvPr/>
+        </p:nvSpPr>
+        <p:spPr>
+          <a:xfrm>
+            <a:off x="8648791" y="4338734"/>
+            <a:ext cx="2463968" cy="369332"/>
+          </a:xfrm>
+          <a:prstGeom prst="rect">
+            <a:avLst/>
+          </a:prstGeom>
+          <a:noFill/>
+        </p:spPr>
+        <p:txBody>
+          <a:bodyPr wrap="square" rtlCol="0">
+            <a:spAutoFit/>
+          </a:bodyPr>
+          <a:lstStyle/>
+          <a:p>
+            <a:r>
+              <a:rPr lang="en-US" dirty="0"/>
+              <a:t>Tree Pit 2</a:t>
+            </a:r>
+          </a:p>
+        </p:txBody>
+      </p:sp>
+    </p:spTree>
+    <p:extLst>
+      <p:ext uri="{BB962C8B-B14F-4D97-AF65-F5344CB8AC3E}">
+        <p14:creationId xmlns:p14="http://schemas.microsoft.com/office/powerpoint/2010/main" val="4207057684"/>
+      </p:ext>
+    </p:extLst>
+  </p:cSld>
+  <p:clrMapOvr>
+    <a:masterClrMapping/>
+  </p:clrMapOvr>
+</p:sld>
+</file>
+
+<file path=ppt/slides/slide8.xml><?xml version="1.0" encoding="utf-8"?>
+<p:sld xmlns:a="http://schemas.openxmlformats.org/drawingml/2006/main" xmlns:r="http://schemas.openxmlformats.org/officeDocument/2006/relationships" xmlns:p="http://schemas.openxmlformats.org/presentationml/2006/main">
+  <p:cSld>
+    <p:spTree>
+      <p:nvGrpSpPr>
+        <p:cNvPr id="1" name=""/>
+        <p:cNvGrpSpPr/>
+        <p:nvPr/>
+      </p:nvGrpSpPr>
+      <p:grpSpPr>
+        <a:xfrm>
+          <a:off x="0" y="0"/>
+          <a:ext cx="0" cy="0"/>
+          <a:chOff x="0" y="0"/>
+          <a:chExt cx="0" cy="0"/>
+        </a:xfrm>
+      </p:grpSpPr>
+      <p:pic>
+        <p:nvPicPr>
+          <p:cNvPr id="2" name="Picture 1">
+            <a:extLst>
+              <a:ext uri="{FF2B5EF4-FFF2-40B4-BE49-F238E27FC236}">
+                <a16:creationId xmlns:a16="http://schemas.microsoft.com/office/drawing/2014/main" id="{169CB205-1E69-D866-70AD-A4898CC39E35}"/>
+              </a:ext>
+            </a:extLst>
+          </p:cNvPr>
+          <p:cNvPicPr>
+            <a:picLocks noChangeAspect="1"/>
+          </p:cNvPicPr>
+          <p:nvPr/>
+        </p:nvPicPr>
+        <p:blipFill>
+          <a:blip r:embed="rId2">
+            <a:extLst>
+              <a:ext uri="{28A0092B-C50C-407E-A947-70E740481C1C}">
+                <a14:useLocalDpi xmlns:a14="http://schemas.microsoft.com/office/drawing/2010/main" val="0"/>
+              </a:ext>
+            </a:extLst>
+          </a:blip>
+          <a:stretch>
+            <a:fillRect/>
+          </a:stretch>
+        </p:blipFill>
+        <p:spPr>
+          <a:xfrm>
+            <a:off x="161285" y="527179"/>
+            <a:ext cx="8630820" cy="2589246"/>
+          </a:xfrm>
+          <a:prstGeom prst="rect">
+            <a:avLst/>
+          </a:prstGeom>
+        </p:spPr>
+      </p:pic>
+      <p:pic>
+        <p:nvPicPr>
+          <p:cNvPr id="3" name="Picture 2">
+            <a:extLst>
+              <a:ext uri="{FF2B5EF4-FFF2-40B4-BE49-F238E27FC236}">
+                <a16:creationId xmlns:a16="http://schemas.microsoft.com/office/drawing/2014/main" id="{BCAD117A-D213-EA91-68A8-9509DEAE8A20}"/>
+              </a:ext>
+            </a:extLst>
+          </p:cNvPr>
+          <p:cNvPicPr>
+            <a:picLocks noChangeAspect="1"/>
+          </p:cNvPicPr>
+          <p:nvPr/>
+        </p:nvPicPr>
+        <p:blipFill>
+          <a:blip r:embed="rId3">
+            <a:extLst>
+              <a:ext uri="{28A0092B-C50C-407E-A947-70E740481C1C}">
+                <a14:useLocalDpi xmlns:a14="http://schemas.microsoft.com/office/drawing/2010/main" val="0"/>
+              </a:ext>
+            </a:extLst>
+          </a:blip>
+          <a:stretch>
+            <a:fillRect/>
+          </a:stretch>
+        </p:blipFill>
+        <p:spPr>
+          <a:xfrm>
+            <a:off x="37951" y="3340359"/>
+            <a:ext cx="8926290" cy="2677887"/>
+          </a:xfrm>
+          <a:prstGeom prst="rect">
+            <a:avLst/>
+          </a:prstGeom>
+        </p:spPr>
+      </p:pic>
+      <p:sp>
+        <p:nvSpPr>
+          <p:cNvPr id="4" name="TextBox 3">
+            <a:extLst>
+              <a:ext uri="{FF2B5EF4-FFF2-40B4-BE49-F238E27FC236}">
+                <a16:creationId xmlns:a16="http://schemas.microsoft.com/office/drawing/2014/main" id="{05986955-14DB-4039-5BD3-030EB2FE0D5E}"/>
+              </a:ext>
+            </a:extLst>
+          </p:cNvPr>
+          <p:cNvSpPr txBox="1"/>
+          <p:nvPr/>
+        </p:nvSpPr>
+        <p:spPr>
+          <a:xfrm>
+            <a:off x="8801191" y="1292647"/>
+            <a:ext cx="2463968" cy="369332"/>
+          </a:xfrm>
+          <a:prstGeom prst="rect">
+            <a:avLst/>
+          </a:prstGeom>
+          <a:noFill/>
+        </p:spPr>
+        <p:txBody>
+          <a:bodyPr wrap="square" rtlCol="0">
+            <a:spAutoFit/>
+          </a:bodyPr>
+          <a:lstStyle/>
+          <a:p>
+            <a:r>
+              <a:rPr lang="en-US" dirty="0"/>
+              <a:t>Tree Pit 3</a:t>
+            </a:r>
+          </a:p>
+        </p:txBody>
+      </p:sp>
+      <p:sp>
+        <p:nvSpPr>
+          <p:cNvPr id="5" name="TextBox 4">
+            <a:extLst>
+              <a:ext uri="{FF2B5EF4-FFF2-40B4-BE49-F238E27FC236}">
+                <a16:creationId xmlns:a16="http://schemas.microsoft.com/office/drawing/2014/main" id="{F17F08D5-A025-6393-8827-56CE5E76CC84}"/>
+              </a:ext>
+            </a:extLst>
+          </p:cNvPr>
+          <p:cNvSpPr txBox="1"/>
+          <p:nvPr/>
+        </p:nvSpPr>
+        <p:spPr>
+          <a:xfrm>
+            <a:off x="9308155" y="4018383"/>
+            <a:ext cx="2463968" cy="369332"/>
+          </a:xfrm>
+          <a:prstGeom prst="rect">
+            <a:avLst/>
+          </a:prstGeom>
+          <a:noFill/>
+        </p:spPr>
+        <p:txBody>
+          <a:bodyPr wrap="square" rtlCol="0">
+            <a:spAutoFit/>
+          </a:bodyPr>
+          <a:lstStyle/>
+          <a:p>
+            <a:r>
+              <a:rPr lang="en-US" dirty="0"/>
+              <a:t>Tree Pit 4</a:t>
+            </a:r>
+          </a:p>
+        </p:txBody>
+      </p:sp>
+    </p:spTree>
+    <p:extLst>
+      <p:ext uri="{BB962C8B-B14F-4D97-AF65-F5344CB8AC3E}">
+        <p14:creationId xmlns:p14="http://schemas.microsoft.com/office/powerpoint/2010/main" val="3964523731"/>
+      </p:ext>
+    </p:extLst>
+  </p:cSld>
+  <p:clrMapOvr>
+    <a:masterClrMapping/>
+  </p:clrMapOvr>
+</p:sld>
+</file>
+
+<file path=ppt/slides/slide9.xml><?xml version="1.0" encoding="utf-8"?>
+<p:sld xmlns:a="http://schemas.openxmlformats.org/drawingml/2006/main" xmlns:r="http://schemas.openxmlformats.org/officeDocument/2006/relationships" xmlns:p="http://schemas.openxmlformats.org/presentationml/2006/main">
+  <p:cSld>
+    <p:spTree>
+      <p:nvGrpSpPr>
+        <p:cNvPr id="1" name=""/>
+        <p:cNvGrpSpPr/>
+        <p:nvPr/>
+      </p:nvGrpSpPr>
+      <p:grpSpPr>
+        <a:xfrm>
+          <a:off x="0" y="0"/>
+          <a:ext cx="0" cy="0"/>
+          <a:chOff x="0" y="0"/>
+          <a:chExt cx="0" cy="0"/>
+        </a:xfrm>
+      </p:grpSpPr>
+      <p:pic>
+        <p:nvPicPr>
+          <p:cNvPr id="5" name="Picture 4">
+            <a:extLst>
+              <a:ext uri="{FF2B5EF4-FFF2-40B4-BE49-F238E27FC236}">
+                <a16:creationId xmlns:a16="http://schemas.microsoft.com/office/drawing/2014/main" id="{78B4DB75-3F29-A421-9CEB-F35B81D4EBDE}"/>
+              </a:ext>
+            </a:extLst>
+          </p:cNvPr>
+          <p:cNvPicPr>
+            <a:picLocks noChangeAspect="1"/>
+          </p:cNvPicPr>
+          <p:nvPr/>
+        </p:nvPicPr>
+        <p:blipFill>
+          <a:blip r:embed="rId2">
+            <a:extLst>
+              <a:ext uri="{28A0092B-C50C-407E-A947-70E740481C1C}">
+                <a14:useLocalDpi xmlns:a14="http://schemas.microsoft.com/office/drawing/2010/main" val="0"/>
+              </a:ext>
+            </a:extLst>
+          </a:blip>
+          <a:stretch>
+            <a:fillRect/>
+          </a:stretch>
+        </p:blipFill>
+        <p:spPr>
+          <a:xfrm>
+            <a:off x="412227" y="341264"/>
+            <a:ext cx="8784005" cy="2635201"/>
+          </a:xfrm>
+          <a:prstGeom prst="rect">
+            <a:avLst/>
+          </a:prstGeom>
+        </p:spPr>
+      </p:pic>
+      <p:pic>
+        <p:nvPicPr>
+          <p:cNvPr id="7" name="Picture 6">
+            <a:extLst>
+              <a:ext uri="{FF2B5EF4-FFF2-40B4-BE49-F238E27FC236}">
+                <a16:creationId xmlns:a16="http://schemas.microsoft.com/office/drawing/2014/main" id="{2C5E0F26-759F-ABE1-20D1-AB11825DB1E0}"/>
+              </a:ext>
+            </a:extLst>
+          </p:cNvPr>
+          <p:cNvPicPr>
+            <a:picLocks noChangeAspect="1"/>
+          </p:cNvPicPr>
+          <p:nvPr/>
+        </p:nvPicPr>
+        <p:blipFill>
+          <a:blip r:embed="rId3">
+            <a:extLst>
+              <a:ext uri="{28A0092B-C50C-407E-A947-70E740481C1C}">
+                <a14:useLocalDpi xmlns:a14="http://schemas.microsoft.com/office/drawing/2010/main" val="0"/>
+              </a:ext>
+            </a:extLst>
+          </a:blip>
+          <a:stretch>
+            <a:fillRect/>
+          </a:stretch>
+        </p:blipFill>
+        <p:spPr>
+          <a:xfrm>
+            <a:off x="30058" y="3541669"/>
+            <a:ext cx="9144018" cy="2743205"/>
+          </a:xfrm>
+          <a:prstGeom prst="rect">
+            <a:avLst/>
+          </a:prstGeom>
+        </p:spPr>
+      </p:pic>
+      <p:sp>
+        <p:nvSpPr>
+          <p:cNvPr id="10" name="TextBox 9">
+            <a:extLst>
+              <a:ext uri="{FF2B5EF4-FFF2-40B4-BE49-F238E27FC236}">
+                <a16:creationId xmlns:a16="http://schemas.microsoft.com/office/drawing/2014/main" id="{EEF5031E-9EAA-4248-5F9C-469799D9E339}"/>
+              </a:ext>
+            </a:extLst>
+          </p:cNvPr>
+          <p:cNvSpPr txBox="1"/>
+          <p:nvPr/>
+        </p:nvSpPr>
+        <p:spPr>
+          <a:xfrm>
+            <a:off x="9196232" y="1436914"/>
+            <a:ext cx="2084478" cy="369332"/>
+          </a:xfrm>
+          <a:prstGeom prst="rect">
+            <a:avLst/>
+          </a:prstGeom>
+          <a:noFill/>
+        </p:spPr>
+        <p:txBody>
+          <a:bodyPr wrap="square" rtlCol="0">
+            <a:spAutoFit/>
+          </a:bodyPr>
+          <a:lstStyle/>
+          <a:p>
+            <a:r>
+              <a:rPr lang="en-US" dirty="0"/>
+              <a:t>Forest Interior 1</a:t>
+            </a:r>
+          </a:p>
+        </p:txBody>
+      </p:sp>
+      <p:sp>
+        <p:nvSpPr>
+          <p:cNvPr id="11" name="TextBox 10">
+            <a:extLst>
+              <a:ext uri="{FF2B5EF4-FFF2-40B4-BE49-F238E27FC236}">
+                <a16:creationId xmlns:a16="http://schemas.microsoft.com/office/drawing/2014/main" id="{E4446029-6B18-87B0-22E8-196C87463E32}"/>
+              </a:ext>
+            </a:extLst>
+          </p:cNvPr>
+          <p:cNvSpPr txBox="1"/>
+          <p:nvPr/>
+        </p:nvSpPr>
+        <p:spPr>
+          <a:xfrm>
+            <a:off x="9196232" y="4351176"/>
+            <a:ext cx="2084478" cy="369332"/>
+          </a:xfrm>
+          <a:prstGeom prst="rect">
+            <a:avLst/>
+          </a:prstGeom>
+          <a:noFill/>
+        </p:spPr>
+        <p:txBody>
+          <a:bodyPr wrap="square" rtlCol="0">
+            <a:spAutoFit/>
+          </a:bodyPr>
+          <a:lstStyle/>
+          <a:p>
+            <a:r>
+              <a:rPr lang="en-US" dirty="0"/>
+              <a:t>Forest Interior 2</a:t>
+            </a:r>
+          </a:p>
+        </p:txBody>
+      </p:sp>
+    </p:spTree>
+    <p:extLst>
+      <p:ext uri="{BB962C8B-B14F-4D97-AF65-F5344CB8AC3E}">
+        <p14:creationId xmlns:p14="http://schemas.microsoft.com/office/powerpoint/2010/main" val="3262427187"/>
       </p:ext>
     </p:extLst>
   </p:cSld>

</xml_diff>